<commit_message>
added github link to presentation
</commit_message>
<xml_diff>
--- a/Presentations/First presentation.pptx
+++ b/Presentations/First presentation.pptx
@@ -6758,6 +6758,78 @@
           </a:p>
         </p:txBody>
       </p:sp>
+      <p:sp>
+        <p:nvSpPr>
+          <p:cNvPr id="4" name="Rettangolo 3">
+            <a:extLst>
+              <a:ext uri="{FF2B5EF4-FFF2-40B4-BE49-F238E27FC236}">
+                <a16:creationId xmlns:a16="http://schemas.microsoft.com/office/drawing/2014/main" id="{145714D3-734F-43FE-8B1B-FA38A11E26F9}"/>
+              </a:ext>
+            </a:extLst>
+          </p:cNvPr>
+          <p:cNvSpPr/>
+          <p:nvPr/>
+        </p:nvSpPr>
+        <p:spPr>
+          <a:xfrm>
+            <a:off x="5034499" y="6163072"/>
+            <a:ext cx="4899483" cy="646331"/>
+          </a:xfrm>
+          <a:prstGeom prst="rect">
+            <a:avLst/>
+          </a:prstGeom>
+        </p:spPr>
+        <p:txBody>
+          <a:bodyPr wrap="none">
+            <a:spAutoFit/>
+          </a:bodyPr>
+          <a:lstStyle/>
+          <a:p>
+            <a:r>
+              <a:rPr lang="en-US" dirty="0">
+                <a:solidFill>
+                  <a:schemeClr val="bg1"/>
+                </a:solidFill>
+              </a:rPr>
+              <a:t>Repository</a:t>
+            </a:r>
+            <a:endParaRPr lang="en-US" dirty="0">
+              <a:solidFill>
+                <a:schemeClr val="bg1"/>
+              </a:solidFill>
+              <a:hlinkClick r:id="rId2">
+                <a:extLst>
+                  <a:ext uri="{A12FA001-AC4F-418D-AE19-62706E023703}">
+                    <ahyp:hlinkClr xmlns:ahyp="http://schemas.microsoft.com/office/drawing/2018/hyperlinkcolor" val="tx"/>
+                  </a:ext>
+                </a:extLst>
+              </a:hlinkClick>
+            </a:endParaRPr>
+          </a:p>
+          <a:p>
+            <a:r>
+              <a:rPr lang="en-US" dirty="0">
+                <a:solidFill>
+                  <a:schemeClr val="bg1"/>
+                </a:solidFill>
+                <a:hlinkClick r:id="rId2">
+                  <a:extLst>
+                    <a:ext uri="{A12FA001-AC4F-418D-AE19-62706E023703}">
+                      <ahyp:hlinkClr xmlns:ahyp="http://schemas.microsoft.com/office/drawing/2018/hyperlinkcolor" val="tx"/>
+                    </a:ext>
+                  </a:extLst>
+                </a:hlinkClick>
+              </a:rPr>
+              <a:t>https://github.com/LuigiSigillo/IotBigProject</a:t>
+            </a:r>
+            <a:endParaRPr lang="en-US" dirty="0">
+              <a:solidFill>
+                <a:schemeClr val="bg1"/>
+              </a:solidFill>
+            </a:endParaRPr>
+          </a:p>
+        </p:txBody>
+      </p:sp>
     </p:spTree>
     <p:extLst>
       <p:ext uri="{BB962C8B-B14F-4D97-AF65-F5344CB8AC3E}">

</xml_diff>

<commit_message>
updated references to Sapienza Museo dell'Arte Classica and to sections
</commit_message>
<xml_diff>
--- a/Presentations/First presentation.pptx
+++ b/Presentations/First presentation.pptx
@@ -847,7 +847,7 @@
           <a:p>
             <a:fld id="{F508663A-A328-45BA-A8DC-088A2118BFD9}" type="datetimeFigureOut">
               <a:rPr lang="en-US" smtClean="0"/>
-              <a:t>4/30/2020</a:t>
+              <a:t>4/30/20</a:t>
             </a:fld>
             <a:endParaRPr lang="en-US"/>
           </a:p>
@@ -1098,7 +1098,7 @@
           <a:p>
             <a:fld id="{F508663A-A328-45BA-A8DC-088A2118BFD9}" type="datetimeFigureOut">
               <a:rPr lang="en-US" smtClean="0"/>
-              <a:t>4/30/2020</a:t>
+              <a:t>4/30/20</a:t>
             </a:fld>
             <a:endParaRPr lang="en-US"/>
           </a:p>
@@ -1412,7 +1412,7 @@
           <a:p>
             <a:fld id="{F508663A-A328-45BA-A8DC-088A2118BFD9}" type="datetimeFigureOut">
               <a:rPr lang="en-US" smtClean="0"/>
-              <a:t>4/30/2020</a:t>
+              <a:t>4/30/20</a:t>
             </a:fld>
             <a:endParaRPr lang="en-US"/>
           </a:p>
@@ -1753,7 +1753,7 @@
           <a:p>
             <a:fld id="{F508663A-A328-45BA-A8DC-088A2118BFD9}" type="datetimeFigureOut">
               <a:rPr lang="en-US" smtClean="0"/>
-              <a:t>4/30/2020</a:t>
+              <a:t>4/30/20</a:t>
             </a:fld>
             <a:endParaRPr lang="en-US"/>
           </a:p>
@@ -2067,7 +2067,7 @@
           <a:p>
             <a:fld id="{F508663A-A328-45BA-A8DC-088A2118BFD9}" type="datetimeFigureOut">
               <a:rPr lang="en-US" smtClean="0"/>
-              <a:t>4/30/2020</a:t>
+              <a:t>4/30/20</a:t>
             </a:fld>
             <a:endParaRPr lang="en-US"/>
           </a:p>
@@ -2460,7 +2460,7 @@
           <a:p>
             <a:fld id="{F508663A-A328-45BA-A8DC-088A2118BFD9}" type="datetimeFigureOut">
               <a:rPr lang="en-US" smtClean="0"/>
-              <a:t>4/30/2020</a:t>
+              <a:t>4/30/20</a:t>
             </a:fld>
             <a:endParaRPr lang="en-US"/>
           </a:p>
@@ -2630,7 +2630,7 @@
           <a:p>
             <a:fld id="{F508663A-A328-45BA-A8DC-088A2118BFD9}" type="datetimeFigureOut">
               <a:rPr lang="en-US" smtClean="0"/>
-              <a:t>4/30/2020</a:t>
+              <a:t>4/30/20</a:t>
             </a:fld>
             <a:endParaRPr lang="en-US"/>
           </a:p>
@@ -2810,7 +2810,7 @@
           <a:p>
             <a:fld id="{F508663A-A328-45BA-A8DC-088A2118BFD9}" type="datetimeFigureOut">
               <a:rPr lang="en-US" smtClean="0"/>
-              <a:t>4/30/2020</a:t>
+              <a:t>4/30/20</a:t>
             </a:fld>
             <a:endParaRPr lang="en-US"/>
           </a:p>
@@ -2986,7 +2986,7 @@
           <a:p>
             <a:fld id="{F508663A-A328-45BA-A8DC-088A2118BFD9}" type="datetimeFigureOut">
               <a:rPr lang="en-US" smtClean="0"/>
-              <a:t>4/30/2020</a:t>
+              <a:t>4/30/20</a:t>
             </a:fld>
             <a:endParaRPr lang="en-US"/>
           </a:p>
@@ -3233,7 +3233,7 @@
           <a:p>
             <a:fld id="{F508663A-A328-45BA-A8DC-088A2118BFD9}" type="datetimeFigureOut">
               <a:rPr lang="en-US" smtClean="0"/>
-              <a:t>4/30/2020</a:t>
+              <a:t>4/30/20</a:t>
             </a:fld>
             <a:endParaRPr lang="en-US"/>
           </a:p>
@@ -3465,7 +3465,7 @@
           <a:p>
             <a:fld id="{F508663A-A328-45BA-A8DC-088A2118BFD9}" type="datetimeFigureOut">
               <a:rPr lang="en-US" smtClean="0"/>
-              <a:t>4/30/2020</a:t>
+              <a:t>4/30/20</a:t>
             </a:fld>
             <a:endParaRPr lang="en-US"/>
           </a:p>
@@ -3839,7 +3839,7 @@
           <a:p>
             <a:fld id="{F508663A-A328-45BA-A8DC-088A2118BFD9}" type="datetimeFigureOut">
               <a:rPr lang="en-US" smtClean="0"/>
-              <a:t>4/30/2020</a:t>
+              <a:t>4/30/20</a:t>
             </a:fld>
             <a:endParaRPr lang="en-US"/>
           </a:p>
@@ -3962,7 +3962,7 @@
           <a:p>
             <a:fld id="{F508663A-A328-45BA-A8DC-088A2118BFD9}" type="datetimeFigureOut">
               <a:rPr lang="en-US" smtClean="0"/>
-              <a:t>4/30/2020</a:t>
+              <a:t>4/30/20</a:t>
             </a:fld>
             <a:endParaRPr lang="en-US"/>
           </a:p>
@@ -4057,7 +4057,7 @@
           <a:p>
             <a:fld id="{F508663A-A328-45BA-A8DC-088A2118BFD9}" type="datetimeFigureOut">
               <a:rPr lang="en-US" smtClean="0"/>
-              <a:t>4/30/2020</a:t>
+              <a:t>4/30/20</a:t>
             </a:fld>
             <a:endParaRPr lang="en-US"/>
           </a:p>
@@ -4312,7 +4312,7 @@
           <a:p>
             <a:fld id="{F508663A-A328-45BA-A8DC-088A2118BFD9}" type="datetimeFigureOut">
               <a:rPr lang="en-US" smtClean="0"/>
-              <a:t>4/30/2020</a:t>
+              <a:t>4/30/20</a:t>
             </a:fld>
             <a:endParaRPr lang="en-US"/>
           </a:p>
@@ -4575,7 +4575,7 @@
           <a:p>
             <a:fld id="{F508663A-A328-45BA-A8DC-088A2118BFD9}" type="datetimeFigureOut">
               <a:rPr lang="en-US" smtClean="0"/>
-              <a:t>4/30/2020</a:t>
+              <a:t>4/30/20</a:t>
             </a:fld>
             <a:endParaRPr lang="en-US"/>
           </a:p>
@@ -5318,7 +5318,7 @@
           <a:p>
             <a:fld id="{F508663A-A328-45BA-A8DC-088A2118BFD9}" type="datetimeFigureOut">
               <a:rPr lang="en-US" smtClean="0"/>
-              <a:t>4/30/2020</a:t>
+              <a:t>4/30/20</a:t>
             </a:fld>
             <a:endParaRPr lang="en-US"/>
           </a:p>
@@ -9150,7 +9150,19 @@
           <a:p>
             <a:r>
               <a:rPr lang="en-US" dirty="0"/>
-              <a:t>It can suggest the next room you could visit based on the time you have spent in the previous rooms. </a:t>
+              <a:t>During a tour in the Sapienza “</a:t>
+            </a:r>
+            <a:r>
+              <a:rPr lang="it-IT" dirty="0"/>
+              <a:t>Museo dell'Arte Classica</a:t>
+            </a:r>
+            <a:r>
+              <a:rPr lang="en-US"/>
+              <a:t>”, it </a:t>
+            </a:r>
+            <a:r>
+              <a:rPr lang="en-US" dirty="0"/>
+              <a:t>can suggest the next section you could visit based on the time you have spent in the previous sections</a:t>
             </a:r>
           </a:p>
           <a:p>
@@ -9168,7 +9180,7 @@
           <a:p>
             <a:r>
               <a:rPr lang="en-US" dirty="0"/>
-              <a:t>The suggestion is sent every time a user is leaving a room.</a:t>
+              <a:t>The suggestion is sent every time a user is leaving a section</a:t>
             </a:r>
             <a:endParaRPr lang="it-IT" dirty="0"/>
           </a:p>

</xml_diff>

<commit_message>
added the possibility to skip the suggestion
</commit_message>
<xml_diff>
--- a/Presentations/First presentation.pptx
+++ b/Presentations/First presentation.pptx
@@ -847,7 +847,7 @@
           <a:p>
             <a:fld id="{F508663A-A328-45BA-A8DC-088A2118BFD9}" type="datetimeFigureOut">
               <a:rPr lang="en-US" smtClean="0"/>
-              <a:t>4/30/20</a:t>
+              <a:t>5/2/20</a:t>
             </a:fld>
             <a:endParaRPr lang="en-US"/>
           </a:p>
@@ -1098,7 +1098,7 @@
           <a:p>
             <a:fld id="{F508663A-A328-45BA-A8DC-088A2118BFD9}" type="datetimeFigureOut">
               <a:rPr lang="en-US" smtClean="0"/>
-              <a:t>4/30/20</a:t>
+              <a:t>5/2/20</a:t>
             </a:fld>
             <a:endParaRPr lang="en-US"/>
           </a:p>
@@ -1412,7 +1412,7 @@
           <a:p>
             <a:fld id="{F508663A-A328-45BA-A8DC-088A2118BFD9}" type="datetimeFigureOut">
               <a:rPr lang="en-US" smtClean="0"/>
-              <a:t>4/30/20</a:t>
+              <a:t>5/2/20</a:t>
             </a:fld>
             <a:endParaRPr lang="en-US"/>
           </a:p>
@@ -1753,7 +1753,7 @@
           <a:p>
             <a:fld id="{F508663A-A328-45BA-A8DC-088A2118BFD9}" type="datetimeFigureOut">
               <a:rPr lang="en-US" smtClean="0"/>
-              <a:t>4/30/20</a:t>
+              <a:t>5/2/20</a:t>
             </a:fld>
             <a:endParaRPr lang="en-US"/>
           </a:p>
@@ -2067,7 +2067,7 @@
           <a:p>
             <a:fld id="{F508663A-A328-45BA-A8DC-088A2118BFD9}" type="datetimeFigureOut">
               <a:rPr lang="en-US" smtClean="0"/>
-              <a:t>4/30/20</a:t>
+              <a:t>5/2/20</a:t>
             </a:fld>
             <a:endParaRPr lang="en-US"/>
           </a:p>
@@ -2460,7 +2460,7 @@
           <a:p>
             <a:fld id="{F508663A-A328-45BA-A8DC-088A2118BFD9}" type="datetimeFigureOut">
               <a:rPr lang="en-US" smtClean="0"/>
-              <a:t>4/30/20</a:t>
+              <a:t>5/2/20</a:t>
             </a:fld>
             <a:endParaRPr lang="en-US"/>
           </a:p>
@@ -2630,7 +2630,7 @@
           <a:p>
             <a:fld id="{F508663A-A328-45BA-A8DC-088A2118BFD9}" type="datetimeFigureOut">
               <a:rPr lang="en-US" smtClean="0"/>
-              <a:t>4/30/20</a:t>
+              <a:t>5/2/20</a:t>
             </a:fld>
             <a:endParaRPr lang="en-US"/>
           </a:p>
@@ -2810,7 +2810,7 @@
           <a:p>
             <a:fld id="{F508663A-A328-45BA-A8DC-088A2118BFD9}" type="datetimeFigureOut">
               <a:rPr lang="en-US" smtClean="0"/>
-              <a:t>4/30/20</a:t>
+              <a:t>5/2/20</a:t>
             </a:fld>
             <a:endParaRPr lang="en-US"/>
           </a:p>
@@ -2986,7 +2986,7 @@
           <a:p>
             <a:fld id="{F508663A-A328-45BA-A8DC-088A2118BFD9}" type="datetimeFigureOut">
               <a:rPr lang="en-US" smtClean="0"/>
-              <a:t>4/30/20</a:t>
+              <a:t>5/2/20</a:t>
             </a:fld>
             <a:endParaRPr lang="en-US"/>
           </a:p>
@@ -3233,7 +3233,7 @@
           <a:p>
             <a:fld id="{F508663A-A328-45BA-A8DC-088A2118BFD9}" type="datetimeFigureOut">
               <a:rPr lang="en-US" smtClean="0"/>
-              <a:t>4/30/20</a:t>
+              <a:t>5/2/20</a:t>
             </a:fld>
             <a:endParaRPr lang="en-US"/>
           </a:p>
@@ -3465,7 +3465,7 @@
           <a:p>
             <a:fld id="{F508663A-A328-45BA-A8DC-088A2118BFD9}" type="datetimeFigureOut">
               <a:rPr lang="en-US" smtClean="0"/>
-              <a:t>4/30/20</a:t>
+              <a:t>5/2/20</a:t>
             </a:fld>
             <a:endParaRPr lang="en-US"/>
           </a:p>
@@ -3839,7 +3839,7 @@
           <a:p>
             <a:fld id="{F508663A-A328-45BA-A8DC-088A2118BFD9}" type="datetimeFigureOut">
               <a:rPr lang="en-US" smtClean="0"/>
-              <a:t>4/30/20</a:t>
+              <a:t>5/2/20</a:t>
             </a:fld>
             <a:endParaRPr lang="en-US"/>
           </a:p>
@@ -3962,7 +3962,7 @@
           <a:p>
             <a:fld id="{F508663A-A328-45BA-A8DC-088A2118BFD9}" type="datetimeFigureOut">
               <a:rPr lang="en-US" smtClean="0"/>
-              <a:t>4/30/20</a:t>
+              <a:t>5/2/20</a:t>
             </a:fld>
             <a:endParaRPr lang="en-US"/>
           </a:p>
@@ -4057,7 +4057,7 @@
           <a:p>
             <a:fld id="{F508663A-A328-45BA-A8DC-088A2118BFD9}" type="datetimeFigureOut">
               <a:rPr lang="en-US" smtClean="0"/>
-              <a:t>4/30/20</a:t>
+              <a:t>5/2/20</a:t>
             </a:fld>
             <a:endParaRPr lang="en-US"/>
           </a:p>
@@ -4312,7 +4312,7 @@
           <a:p>
             <a:fld id="{F508663A-A328-45BA-A8DC-088A2118BFD9}" type="datetimeFigureOut">
               <a:rPr lang="en-US" smtClean="0"/>
-              <a:t>4/30/20</a:t>
+              <a:t>5/2/20</a:t>
             </a:fld>
             <a:endParaRPr lang="en-US"/>
           </a:p>
@@ -4575,7 +4575,7 @@
           <a:p>
             <a:fld id="{F508663A-A328-45BA-A8DC-088A2118BFD9}" type="datetimeFigureOut">
               <a:rPr lang="en-US" smtClean="0"/>
-              <a:t>4/30/20</a:t>
+              <a:t>5/2/20</a:t>
             </a:fld>
             <a:endParaRPr lang="en-US"/>
           </a:p>
@@ -5318,7 +5318,7 @@
           <a:p>
             <a:fld id="{F508663A-A328-45BA-A8DC-088A2118BFD9}" type="datetimeFigureOut">
               <a:rPr lang="en-US" smtClean="0"/>
-              <a:t>4/30/20</a:t>
+              <a:t>5/2/20</a:t>
             </a:fld>
             <a:endParaRPr lang="en-US"/>
           </a:p>
@@ -9157,12 +9157,14 @@
               <a:t>Museo dell'Arte Classica</a:t>
             </a:r>
             <a:r>
-              <a:rPr lang="en-US"/>
-              <a:t>”, it </a:t>
-            </a:r>
-            <a:r>
               <a:rPr lang="en-US" dirty="0"/>
-              <a:t>can suggest the next section you could visit based on the time you have spent in the previous sections</a:t>
+              <a:t>”, it can suggest the next section you could visit based on the time you have spent in the previous sections</a:t>
+            </a:r>
+          </a:p>
+          <a:p>
+            <a:r>
+              <a:rPr lang="en-US" dirty="0"/>
+              <a:t>The application will display a preview of the suggested section, so that the user could choose to follow it or to jump to another suggestion.</a:t>
             </a:r>
           </a:p>
           <a:p>
@@ -9174,13 +9176,13 @@
           <a:p>
             <a:r>
               <a:rPr lang="en-US" dirty="0"/>
-              <a:t>The smartphone starts collecting data, in an anonymous way, to make the best suggestion for every user</a:t>
+              <a:t>The smartphone starts collecting data, in an anonymous way, to make the best suggestions for every user</a:t>
             </a:r>
           </a:p>
           <a:p>
             <a:r>
               <a:rPr lang="en-US" dirty="0"/>
-              <a:t>The suggestion is sent every time a user is leaving a section</a:t>
+              <a:t>The suggestions are sent every time a user is leaving a section</a:t>
             </a:r>
             <a:endParaRPr lang="it-IT" dirty="0"/>
           </a:p>
@@ -9341,19 +9343,17 @@
       </p:sp>
       <p:pic>
         <p:nvPicPr>
-          <p:cNvPr id="7" name="Segnaposto contenuto 6" descr="Immagine che contiene screenshot&#10;&#10;Descrizione generata automaticamente">
+          <p:cNvPr id="4" name="Immagine 3">
             <a:extLst>
               <a:ext uri="{FF2B5EF4-FFF2-40B4-BE49-F238E27FC236}">
-                <a16:creationId xmlns:a16="http://schemas.microsoft.com/office/drawing/2014/main" id="{B9758A09-9A49-4E35-8767-DD2EDA10FBAE}"/>
+                <a16:creationId xmlns:a16="http://schemas.microsoft.com/office/drawing/2014/main" id="{8CB88F18-87F0-DF4C-9FB5-B5F6B1731B22}"/>
               </a:ext>
             </a:extLst>
           </p:cNvPr>
           <p:cNvPicPr>
-            <a:picLocks noGrp="1" noChangeAspect="1"/>
+            <a:picLocks noChangeAspect="1"/>
           </p:cNvPicPr>
-          <p:nvPr>
-            <p:ph idx="1"/>
-          </p:nvPr>
+          <p:nvPr/>
         </p:nvPicPr>
         <p:blipFill>
           <a:blip r:embed="rId2">
@@ -9369,9 +9369,12 @@
         </p:blipFill>
         <p:spPr>
           <a:xfrm>
-            <a:off x="964604" y="1930400"/>
-            <a:ext cx="8309398" cy="4377754"/>
+            <a:off x="962400" y="1930400"/>
+            <a:ext cx="8311602" cy="4376594"/>
           </a:xfrm>
+          <a:prstGeom prst="rect">
+            <a:avLst/>
+          </a:prstGeom>
         </p:spPr>
       </p:pic>
     </p:spTree>
@@ -9717,8 +9720,13 @@
           <a:p>
             <a:r>
               <a:rPr lang="en-US" dirty="0"/>
-              <a:t>We are planning evaluate the user experience using mockups, and after every demo of these prototypes we will collect people's opinions asking for feedbacks.</a:t>
-            </a:r>
+              <a:t>We are planning evaluate the user experience using mockups, and after every demo of these prototypes we will collect people's opinions asking for feedbacks and publishing some </a:t>
+            </a:r>
+            <a:r>
+              <a:rPr lang="en-US"/>
+              <a:t>google forms.</a:t>
+            </a:r>
+            <a:endParaRPr lang="en-US" dirty="0"/>
           </a:p>
           <a:p>
             <a:r>

</xml_diff>